<commit_message>
added draft for Python 1 lab
</commit_message>
<xml_diff>
--- a/semester1_technology_skills/04_python1/slides/DigitalSkills_01_04_Python1_220221_v2.pptx
+++ b/semester1_technology_skills/04_python1/slides/DigitalSkills_01_04_Python1_220221_v2.pptx
@@ -5,18 +5,19 @@
     <p:sldMasterId id="2147483648" r:id="rId1"/>
   </p:sldMasterIdLst>
   <p:notesMasterIdLst>
-    <p:notesMasterId r:id="rId6"/>
+    <p:notesMasterId r:id="rId7"/>
   </p:notesMasterIdLst>
   <p:sldIdLst>
     <p:sldId id="428" r:id="rId2"/>
     <p:sldId id="432" r:id="rId3"/>
     <p:sldId id="434" r:id="rId4"/>
     <p:sldId id="433" r:id="rId5"/>
+    <p:sldId id="435" r:id="rId6"/>
   </p:sldIdLst>
   <p:sldSz cx="12192000" cy="6858000"/>
   <p:notesSz cx="6858000" cy="9144000"/>
   <p:custDataLst>
-    <p:tags r:id="rId7"/>
+    <p:tags r:id="rId8"/>
   </p:custDataLst>
   <p:defaultTextStyle>
     <a:defPPr>
@@ -214,7 +215,7 @@
           <a:p>
             <a:fld id="{DE7E3AB8-876E-1542-BA35-CC1AAFD17F71}" type="datetimeFigureOut">
               <a:rPr lang="de-DE" smtClean="0"/>
-              <a:t>21.02.22</a:t>
+              <a:t>23.02.22</a:t>
             </a:fld>
             <a:endParaRPr lang="de-DE"/>
           </a:p>
@@ -4550,7 +4551,7 @@
           <a:graphicData uri="http://schemas.openxmlformats.org/presentationml/2006/ole">
             <mc:AlternateContent xmlns:mc="http://schemas.openxmlformats.org/markup-compatibility/2006">
               <mc:Choice xmlns:v="urn:schemas-microsoft-com:vml" Requires="v">
-                <p:oleObj spid="_x0000_s1080" name="think-cell Slide" r:id="rId13" imgW="7772400" imgH="10058400" progId="TCLayout.ActiveDocument.1">
+                <p:oleObj spid="_x0000_s1082" name="think-cell Slide" r:id="rId13" imgW="7772400" imgH="10058400" progId="TCLayout.ActiveDocument.1">
                   <p:embed/>
                 </p:oleObj>
               </mc:Choice>
@@ -4731,7 +4732,7 @@
           <a:p>
             <a:fld id="{8C445101-65EE-0048-9A14-29E3837D9AD2}" type="datetimeFigureOut">
               <a:rPr lang="de-DE" smtClean="0"/>
-              <a:t>21.02.22</a:t>
+              <a:t>23.02.22</a:t>
             </a:fld>
             <a:endParaRPr lang="de-DE"/>
           </a:p>
@@ -5177,7 +5178,7 @@
           <a:graphicData uri="http://schemas.openxmlformats.org/presentationml/2006/ole">
             <mc:AlternateContent xmlns:mc="http://schemas.openxmlformats.org/markup-compatibility/2006">
               <mc:Choice xmlns:v="urn:schemas-microsoft-com:vml" Requires="v">
-                <p:oleObj spid="_x0000_s2054" name="think-cell Slide" r:id="rId4" imgW="7772400" imgH="10058400" progId="TCLayout.ActiveDocument.1">
+                <p:oleObj spid="_x0000_s2056" name="think-cell Slide" r:id="rId4" imgW="7772400" imgH="10058400" progId="TCLayout.ActiveDocument.1">
                   <p:embed/>
                 </p:oleObj>
               </mc:Choice>
@@ -5357,7 +5358,7 @@
           <a:graphicData uri="http://schemas.openxmlformats.org/presentationml/2006/ole">
             <mc:AlternateContent xmlns:mc="http://schemas.openxmlformats.org/markup-compatibility/2006">
               <mc:Choice xmlns:v="urn:schemas-microsoft-com:vml" Requires="v">
-                <p:oleObj spid="_x0000_s3078" name="think-cell Slide" r:id="rId4" imgW="7772400" imgH="10058400" progId="TCLayout.ActiveDocument.1">
+                <p:oleObj spid="_x0000_s3080" name="think-cell Slide" r:id="rId4" imgW="7772400" imgH="10058400" progId="TCLayout.ActiveDocument.1">
                   <p:embed/>
                 </p:oleObj>
               </mc:Choice>
@@ -5670,7 +5671,7 @@
           <a:graphicData uri="http://schemas.openxmlformats.org/presentationml/2006/ole">
             <mc:AlternateContent xmlns:mc="http://schemas.openxmlformats.org/markup-compatibility/2006">
               <mc:Choice xmlns:v="urn:schemas-microsoft-com:vml" Requires="v">
-                <p:oleObj spid="_x0000_s5121" name="think-cell Slide" r:id="rId4" imgW="7772400" imgH="10058400" progId="TCLayout.ActiveDocument.1">
+                <p:oleObj spid="_x0000_s5123" name="think-cell Slide" r:id="rId4" imgW="7772400" imgH="10058400" progId="TCLayout.ActiveDocument.1">
                   <p:embed/>
                 </p:oleObj>
               </mc:Choice>
@@ -5989,7 +5990,7 @@
           <a:graphicData uri="http://schemas.openxmlformats.org/presentationml/2006/ole">
             <mc:AlternateContent xmlns:mc="http://schemas.openxmlformats.org/markup-compatibility/2006">
               <mc:Choice xmlns:v="urn:schemas-microsoft-com:vml" Requires="v">
-                <p:oleObj spid="_x0000_s4102" name="think-cell Slide" r:id="rId4" imgW="7772400" imgH="10058400" progId="TCLayout.ActiveDocument.1">
+                <p:oleObj spid="_x0000_s4104" name="think-cell Slide" r:id="rId4" imgW="7772400" imgH="10058400" progId="TCLayout.ActiveDocument.1">
                   <p:embed/>
                 </p:oleObj>
               </mc:Choice>
@@ -6265,6 +6266,764 @@
 </p:sld>
 </file>
 
+<file path=ppt/slides/slide5.xml><?xml version="1.0" encoding="utf-8"?>
+<p:sld xmlns:a="http://schemas.openxmlformats.org/drawingml/2006/main" xmlns:r="http://schemas.openxmlformats.org/officeDocument/2006/relationships" xmlns:p="http://schemas.openxmlformats.org/presentationml/2006/main">
+  <p:cSld>
+    <p:spTree>
+      <p:nvGrpSpPr>
+        <p:cNvPr id="1" name=""/>
+        <p:cNvGrpSpPr/>
+        <p:nvPr/>
+      </p:nvGrpSpPr>
+      <p:grpSpPr>
+        <a:xfrm>
+          <a:off x="0" y="0"/>
+          <a:ext cx="0" cy="0"/>
+          <a:chOff x="0" y="0"/>
+          <a:chExt cx="0" cy="0"/>
+        </a:xfrm>
+      </p:grpSpPr>
+      <p:graphicFrame>
+        <p:nvGraphicFramePr>
+          <p:cNvPr id="4" name="Object 3" hidden="1">
+            <a:extLst>
+              <a:ext uri="{FF2B5EF4-FFF2-40B4-BE49-F238E27FC236}">
+                <a16:creationId xmlns:a16="http://schemas.microsoft.com/office/drawing/2014/main" id="{00157BD2-12ED-954F-9BA2-3DB7503C79E9}"/>
+              </a:ext>
+            </a:extLst>
+          </p:cNvPr>
+          <p:cNvGraphicFramePr>
+            <a:graphicFrameLocks noChangeAspect="1"/>
+          </p:cNvGraphicFramePr>
+          <p:nvPr>
+            <p:custDataLst>
+              <p:tags r:id="rId2"/>
+            </p:custDataLst>
+            <p:extLst>
+              <p:ext uri="{D42A27DB-BD31-4B8C-83A1-F6EECF244321}">
+                <p14:modId xmlns:p14="http://schemas.microsoft.com/office/powerpoint/2010/main" val="1714295803"/>
+              </p:ext>
+            </p:extLst>
+          </p:nvPr>
+        </p:nvGraphicFramePr>
+        <p:xfrm>
+          <a:off x="1588" y="1588"/>
+          <a:ext cx="1227" cy="1588"/>
+        </p:xfrm>
+        <a:graphic>
+          <a:graphicData uri="http://schemas.openxmlformats.org/presentationml/2006/ole">
+            <mc:AlternateContent xmlns:mc="http://schemas.openxmlformats.org/markup-compatibility/2006">
+              <mc:Choice xmlns:v="urn:schemas-microsoft-com:vml" Requires="v">
+                <p:oleObj spid="_x0000_s7170" name="think-cell Slide" r:id="rId4" imgW="7772400" imgH="10058400" progId="TCLayout.ActiveDocument.1">
+                  <p:embed/>
+                </p:oleObj>
+              </mc:Choice>
+              <mc:Fallback>
+                <p:oleObj name="think-cell Slide" r:id="rId4" imgW="7772400" imgH="10058400" progId="TCLayout.ActiveDocument.1">
+                  <p:embed/>
+                  <p:pic>
+                    <p:nvPicPr>
+                      <p:cNvPr id="0" name=""/>
+                      <p:cNvPicPr/>
+                      <p:nvPr/>
+                    </p:nvPicPr>
+                    <p:blipFill>
+                      <a:blip r:embed="rId5"/>
+                      <a:stretch>
+                        <a:fillRect/>
+                      </a:stretch>
+                    </p:blipFill>
+                    <p:spPr>
+                      <a:xfrm>
+                        <a:off x="1588" y="1588"/>
+                        <a:ext cx="1227" cy="1588"/>
+                      </a:xfrm>
+                      <a:prstGeom prst="rect">
+                        <a:avLst/>
+                      </a:prstGeom>
+                    </p:spPr>
+                  </p:pic>
+                </p:oleObj>
+              </mc:Fallback>
+            </mc:AlternateContent>
+          </a:graphicData>
+        </a:graphic>
+      </p:graphicFrame>
+      <p:sp>
+        <p:nvSpPr>
+          <p:cNvPr id="2" name="Title 1">
+            <a:extLst>
+              <a:ext uri="{FF2B5EF4-FFF2-40B4-BE49-F238E27FC236}">
+                <a16:creationId xmlns:a16="http://schemas.microsoft.com/office/drawing/2014/main" id="{3686355F-B6C5-7A4A-AB63-404AF6748027}"/>
+              </a:ext>
+            </a:extLst>
+          </p:cNvPr>
+          <p:cNvSpPr>
+            <a:spLocks noGrp="1"/>
+          </p:cNvSpPr>
+          <p:nvPr>
+            <p:ph type="title"/>
+          </p:nvPr>
+        </p:nvSpPr>
+        <p:spPr/>
+        <p:txBody>
+          <a:bodyPr vert="horz"/>
+          <a:lstStyle/>
+          <a:p>
+            <a:r>
+              <a:rPr lang="de-DE" dirty="0"/>
+              <a:t>Pseudocode</a:t>
+            </a:r>
+          </a:p>
+        </p:txBody>
+      </p:sp>
+      <p:sp>
+        <p:nvSpPr>
+          <p:cNvPr id="3" name="Content Placeholder 2">
+            <a:extLst>
+              <a:ext uri="{FF2B5EF4-FFF2-40B4-BE49-F238E27FC236}">
+                <a16:creationId xmlns:a16="http://schemas.microsoft.com/office/drawing/2014/main" id="{537D458F-603B-A84C-8B08-6550F16DD2AF}"/>
+              </a:ext>
+            </a:extLst>
+          </p:cNvPr>
+          <p:cNvSpPr>
+            <a:spLocks noGrp="1"/>
+          </p:cNvSpPr>
+          <p:nvPr>
+            <p:ph idx="1"/>
+          </p:nvPr>
+        </p:nvSpPr>
+        <p:spPr>
+          <a:xfrm>
+            <a:off x="517747" y="1111184"/>
+            <a:ext cx="7198285" cy="4351338"/>
+          </a:xfrm>
+        </p:spPr>
+        <p:txBody>
+          <a:bodyPr>
+            <a:noAutofit/>
+          </a:bodyPr>
+          <a:lstStyle/>
+          <a:p>
+            <a:pPr marL="0" indent="0">
+              <a:buNone/>
+            </a:pPr>
+            <a:r>
+              <a:rPr lang="de-DE" sz="1800" dirty="0">
+                <a:latin typeface="Source Code Pro" panose="020B0509030403020204" pitchFamily="49" charset="77"/>
+              </a:rPr>
+              <a:t>1 Pick </a:t>
+            </a:r>
+            <a:r>
+              <a:rPr lang="de-DE" sz="1800" dirty="0" err="1">
+                <a:latin typeface="Source Code Pro" panose="020B0509030403020204" pitchFamily="49" charset="77"/>
+              </a:rPr>
+              <a:t>up</a:t>
+            </a:r>
+            <a:r>
+              <a:rPr lang="de-DE" sz="1800" dirty="0">
+                <a:latin typeface="Source Code Pro" panose="020B0509030403020204" pitchFamily="49" charset="77"/>
+              </a:rPr>
+              <a:t> </a:t>
+            </a:r>
+            <a:r>
+              <a:rPr lang="de-DE" sz="1800" dirty="0" err="1">
+                <a:latin typeface="Source Code Pro" panose="020B0509030403020204" pitchFamily="49" charset="77"/>
+              </a:rPr>
+              <a:t>phone</a:t>
+            </a:r>
+            <a:r>
+              <a:rPr lang="de-DE" sz="1800" dirty="0">
+                <a:latin typeface="Source Code Pro" panose="020B0509030403020204" pitchFamily="49" charset="77"/>
+              </a:rPr>
+              <a:t> </a:t>
+            </a:r>
+            <a:r>
+              <a:rPr lang="de-DE" sz="1800" dirty="0" err="1">
+                <a:latin typeface="Source Code Pro" panose="020B0509030403020204" pitchFamily="49" charset="77"/>
+              </a:rPr>
+              <a:t>book</a:t>
+            </a:r>
+            <a:endParaRPr lang="de-DE" sz="1800" dirty="0">
+              <a:latin typeface="Source Code Pro" panose="020B0509030403020204" pitchFamily="49" charset="77"/>
+            </a:endParaRPr>
+          </a:p>
+          <a:p>
+            <a:pPr marL="0" indent="0">
+              <a:buNone/>
+            </a:pPr>
+            <a:r>
+              <a:rPr lang="de-DE" sz="1800" dirty="0">
+                <a:latin typeface="Source Code Pro" panose="020B0509030403020204" pitchFamily="49" charset="77"/>
+              </a:rPr>
+              <a:t>2 Open </a:t>
+            </a:r>
+            <a:r>
+              <a:rPr lang="de-DE" sz="1800" dirty="0" err="1">
+                <a:latin typeface="Source Code Pro" panose="020B0509030403020204" pitchFamily="49" charset="77"/>
+              </a:rPr>
+              <a:t>to</a:t>
+            </a:r>
+            <a:r>
+              <a:rPr lang="de-DE" sz="1800" dirty="0">
+                <a:latin typeface="Source Code Pro" panose="020B0509030403020204" pitchFamily="49" charset="77"/>
+              </a:rPr>
+              <a:t> </a:t>
+            </a:r>
+            <a:r>
+              <a:rPr lang="de-DE" sz="1800" dirty="0" err="1">
+                <a:latin typeface="Source Code Pro" panose="020B0509030403020204" pitchFamily="49" charset="77"/>
+              </a:rPr>
+              <a:t>middle</a:t>
+            </a:r>
+            <a:r>
+              <a:rPr lang="de-DE" sz="1800" dirty="0">
+                <a:latin typeface="Source Code Pro" panose="020B0509030403020204" pitchFamily="49" charset="77"/>
+              </a:rPr>
+              <a:t> </a:t>
+            </a:r>
+            <a:r>
+              <a:rPr lang="de-DE" sz="1800" dirty="0" err="1">
+                <a:latin typeface="Source Code Pro" panose="020B0509030403020204" pitchFamily="49" charset="77"/>
+              </a:rPr>
+              <a:t>of</a:t>
+            </a:r>
+            <a:r>
+              <a:rPr lang="de-DE" sz="1800" dirty="0">
+                <a:latin typeface="Source Code Pro" panose="020B0509030403020204" pitchFamily="49" charset="77"/>
+              </a:rPr>
+              <a:t> </a:t>
+            </a:r>
+            <a:r>
+              <a:rPr lang="de-DE" sz="1800" dirty="0" err="1">
+                <a:latin typeface="Source Code Pro" panose="020B0509030403020204" pitchFamily="49" charset="77"/>
+              </a:rPr>
+              <a:t>phone</a:t>
+            </a:r>
+            <a:r>
+              <a:rPr lang="de-DE" sz="1800" dirty="0">
+                <a:latin typeface="Source Code Pro" panose="020B0509030403020204" pitchFamily="49" charset="77"/>
+              </a:rPr>
+              <a:t> </a:t>
+            </a:r>
+            <a:r>
+              <a:rPr lang="de-DE" sz="1800" dirty="0" err="1">
+                <a:latin typeface="Source Code Pro" panose="020B0509030403020204" pitchFamily="49" charset="77"/>
+              </a:rPr>
+              <a:t>book</a:t>
+            </a:r>
+            <a:endParaRPr lang="de-DE" sz="1800" dirty="0">
+              <a:latin typeface="Source Code Pro" panose="020B0509030403020204" pitchFamily="49" charset="77"/>
+            </a:endParaRPr>
+          </a:p>
+          <a:p>
+            <a:pPr marL="0" indent="0">
+              <a:buNone/>
+            </a:pPr>
+            <a:r>
+              <a:rPr lang="de-DE" sz="1800" dirty="0">
+                <a:latin typeface="Source Code Pro" panose="020B0509030403020204" pitchFamily="49" charset="77"/>
+              </a:rPr>
+              <a:t>3 Look at </a:t>
+            </a:r>
+            <a:r>
+              <a:rPr lang="de-DE" sz="1800" dirty="0" err="1">
+                <a:latin typeface="Source Code Pro" panose="020B0509030403020204" pitchFamily="49" charset="77"/>
+              </a:rPr>
+              <a:t>page</a:t>
+            </a:r>
+            <a:endParaRPr lang="de-DE" sz="1800" dirty="0">
+              <a:latin typeface="Source Code Pro" panose="020B0509030403020204" pitchFamily="49" charset="77"/>
+            </a:endParaRPr>
+          </a:p>
+          <a:p>
+            <a:pPr marL="0" indent="0">
+              <a:buNone/>
+            </a:pPr>
+            <a:r>
+              <a:rPr lang="de-DE" sz="1800" dirty="0">
+                <a:latin typeface="Source Code Pro" panose="020B0509030403020204" pitchFamily="49" charset="77"/>
+              </a:rPr>
+              <a:t>4 </a:t>
+            </a:r>
+            <a:r>
+              <a:rPr lang="de-DE" sz="1800" dirty="0" err="1">
+                <a:latin typeface="Source Code Pro" panose="020B0509030403020204" pitchFamily="49" charset="77"/>
+              </a:rPr>
+              <a:t>If</a:t>
+            </a:r>
+            <a:r>
+              <a:rPr lang="de-DE" sz="1800" dirty="0">
+                <a:latin typeface="Source Code Pro" panose="020B0509030403020204" pitchFamily="49" charset="77"/>
+              </a:rPr>
+              <a:t> </a:t>
+            </a:r>
+            <a:r>
+              <a:rPr lang="de-DE" sz="1800" dirty="0" err="1">
+                <a:latin typeface="Source Code Pro" panose="020B0509030403020204" pitchFamily="49" charset="77"/>
+              </a:rPr>
+              <a:t>person</a:t>
+            </a:r>
+            <a:r>
+              <a:rPr lang="de-DE" sz="1800" dirty="0">
+                <a:latin typeface="Source Code Pro" panose="020B0509030403020204" pitchFamily="49" charset="77"/>
+              </a:rPr>
+              <a:t> </a:t>
+            </a:r>
+            <a:r>
+              <a:rPr lang="de-DE" sz="1800" dirty="0" err="1">
+                <a:latin typeface="Source Code Pro" panose="020B0509030403020204" pitchFamily="49" charset="77"/>
+              </a:rPr>
+              <a:t>is</a:t>
+            </a:r>
+            <a:r>
+              <a:rPr lang="de-DE" sz="1800" dirty="0">
+                <a:latin typeface="Source Code Pro" panose="020B0509030403020204" pitchFamily="49" charset="77"/>
+              </a:rPr>
+              <a:t> on </a:t>
+            </a:r>
+            <a:r>
+              <a:rPr lang="de-DE" sz="1800" dirty="0" err="1">
+                <a:latin typeface="Source Code Pro" panose="020B0509030403020204" pitchFamily="49" charset="77"/>
+              </a:rPr>
+              <a:t>page</a:t>
+            </a:r>
+            <a:endParaRPr lang="de-DE" sz="1800" dirty="0">
+              <a:latin typeface="Source Code Pro" panose="020B0509030403020204" pitchFamily="49" charset="77"/>
+            </a:endParaRPr>
+          </a:p>
+          <a:p>
+            <a:pPr marL="0" indent="0">
+              <a:buNone/>
+            </a:pPr>
+            <a:r>
+              <a:rPr lang="de-DE" sz="1800" dirty="0">
+                <a:latin typeface="Source Code Pro" panose="020B0509030403020204" pitchFamily="49" charset="77"/>
+              </a:rPr>
+              <a:t>5	Call </a:t>
+            </a:r>
+            <a:r>
+              <a:rPr lang="de-DE" sz="1800" dirty="0" err="1">
+                <a:latin typeface="Source Code Pro" panose="020B0509030403020204" pitchFamily="49" charset="77"/>
+              </a:rPr>
+              <a:t>person</a:t>
+            </a:r>
+            <a:endParaRPr lang="de-DE" sz="1800" dirty="0">
+              <a:latin typeface="Source Code Pro" panose="020B0509030403020204" pitchFamily="49" charset="77"/>
+            </a:endParaRPr>
+          </a:p>
+          <a:p>
+            <a:pPr marL="0" indent="0">
+              <a:buNone/>
+            </a:pPr>
+            <a:r>
+              <a:rPr lang="de-DE" sz="1800" dirty="0">
+                <a:latin typeface="Source Code Pro" panose="020B0509030403020204" pitchFamily="49" charset="77"/>
+              </a:rPr>
+              <a:t>6 Else </a:t>
+            </a:r>
+            <a:r>
+              <a:rPr lang="de-DE" sz="1800" dirty="0" err="1">
+                <a:latin typeface="Source Code Pro" panose="020B0509030403020204" pitchFamily="49" charset="77"/>
+              </a:rPr>
+              <a:t>if</a:t>
+            </a:r>
+            <a:r>
+              <a:rPr lang="de-DE" sz="1800" dirty="0">
+                <a:latin typeface="Source Code Pro" panose="020B0509030403020204" pitchFamily="49" charset="77"/>
+              </a:rPr>
+              <a:t> </a:t>
+            </a:r>
+            <a:r>
+              <a:rPr lang="de-DE" sz="1800" dirty="0" err="1">
+                <a:latin typeface="Source Code Pro" panose="020B0509030403020204" pitchFamily="49" charset="77"/>
+              </a:rPr>
+              <a:t>person</a:t>
+            </a:r>
+            <a:r>
+              <a:rPr lang="de-DE" sz="1800" dirty="0">
+                <a:latin typeface="Source Code Pro" panose="020B0509030403020204" pitchFamily="49" charset="77"/>
+              </a:rPr>
+              <a:t> </a:t>
+            </a:r>
+            <a:r>
+              <a:rPr lang="de-DE" sz="1800" dirty="0" err="1">
+                <a:latin typeface="Source Code Pro" panose="020B0509030403020204" pitchFamily="49" charset="77"/>
+              </a:rPr>
+              <a:t>is</a:t>
+            </a:r>
+            <a:r>
+              <a:rPr lang="de-DE" sz="1800" dirty="0">
+                <a:latin typeface="Source Code Pro" panose="020B0509030403020204" pitchFamily="49" charset="77"/>
+              </a:rPr>
+              <a:t> </a:t>
+            </a:r>
+            <a:r>
+              <a:rPr lang="de-DE" sz="1800" dirty="0" err="1">
+                <a:latin typeface="Source Code Pro" panose="020B0509030403020204" pitchFamily="49" charset="77"/>
+              </a:rPr>
+              <a:t>earlier</a:t>
+            </a:r>
+            <a:r>
+              <a:rPr lang="de-DE" sz="1800" dirty="0">
+                <a:latin typeface="Source Code Pro" panose="020B0509030403020204" pitchFamily="49" charset="77"/>
+              </a:rPr>
+              <a:t> in </a:t>
+            </a:r>
+            <a:r>
+              <a:rPr lang="de-DE" sz="1800" dirty="0" err="1">
+                <a:latin typeface="Source Code Pro" panose="020B0509030403020204" pitchFamily="49" charset="77"/>
+              </a:rPr>
+              <a:t>book</a:t>
+            </a:r>
+            <a:endParaRPr lang="de-DE" sz="1800" dirty="0">
+              <a:latin typeface="Source Code Pro" panose="020B0509030403020204" pitchFamily="49" charset="77"/>
+            </a:endParaRPr>
+          </a:p>
+          <a:p>
+            <a:pPr marL="0" indent="0">
+              <a:buNone/>
+            </a:pPr>
+            <a:r>
+              <a:rPr lang="de-DE" sz="1800" dirty="0">
+                <a:latin typeface="Source Code Pro" panose="020B0509030403020204" pitchFamily="49" charset="77"/>
+              </a:rPr>
+              <a:t>7   Open </a:t>
+            </a:r>
+            <a:r>
+              <a:rPr lang="de-DE" sz="1800" dirty="0" err="1">
+                <a:latin typeface="Source Code Pro" panose="020B0509030403020204" pitchFamily="49" charset="77"/>
+              </a:rPr>
+              <a:t>to</a:t>
+            </a:r>
+            <a:r>
+              <a:rPr lang="de-DE" sz="1800" dirty="0">
+                <a:latin typeface="Source Code Pro" panose="020B0509030403020204" pitchFamily="49" charset="77"/>
+              </a:rPr>
+              <a:t> </a:t>
+            </a:r>
+            <a:r>
+              <a:rPr lang="de-DE" sz="1800" dirty="0" err="1">
+                <a:latin typeface="Source Code Pro" panose="020B0509030403020204" pitchFamily="49" charset="77"/>
+              </a:rPr>
+              <a:t>middle</a:t>
+            </a:r>
+            <a:r>
+              <a:rPr lang="de-DE" sz="1800" dirty="0">
+                <a:latin typeface="Source Code Pro" panose="020B0509030403020204" pitchFamily="49" charset="77"/>
+              </a:rPr>
+              <a:t> </a:t>
+            </a:r>
+            <a:r>
+              <a:rPr lang="de-DE" sz="1800" dirty="0" err="1">
+                <a:latin typeface="Source Code Pro" panose="020B0509030403020204" pitchFamily="49" charset="77"/>
+              </a:rPr>
+              <a:t>of</a:t>
+            </a:r>
+            <a:r>
+              <a:rPr lang="de-DE" sz="1800" dirty="0">
+                <a:latin typeface="Source Code Pro" panose="020B0509030403020204" pitchFamily="49" charset="77"/>
+              </a:rPr>
+              <a:t> </a:t>
+            </a:r>
+            <a:r>
+              <a:rPr lang="de-DE" sz="1800" dirty="0" err="1">
+                <a:latin typeface="Source Code Pro" panose="020B0509030403020204" pitchFamily="49" charset="77"/>
+              </a:rPr>
+              <a:t>left</a:t>
+            </a:r>
+            <a:r>
+              <a:rPr lang="de-DE" sz="1800" dirty="0">
+                <a:latin typeface="Source Code Pro" panose="020B0509030403020204" pitchFamily="49" charset="77"/>
+              </a:rPr>
+              <a:t> half </a:t>
+            </a:r>
+            <a:r>
+              <a:rPr lang="de-DE" sz="1800" dirty="0" err="1">
+                <a:latin typeface="Source Code Pro" panose="020B0509030403020204" pitchFamily="49" charset="77"/>
+              </a:rPr>
+              <a:t>of</a:t>
+            </a:r>
+            <a:r>
+              <a:rPr lang="de-DE" sz="1800" dirty="0">
+                <a:latin typeface="Source Code Pro" panose="020B0509030403020204" pitchFamily="49" charset="77"/>
+              </a:rPr>
+              <a:t> </a:t>
+            </a:r>
+            <a:r>
+              <a:rPr lang="de-DE" sz="1800" dirty="0" err="1">
+                <a:latin typeface="Source Code Pro" panose="020B0509030403020204" pitchFamily="49" charset="77"/>
+              </a:rPr>
+              <a:t>book</a:t>
+            </a:r>
+            <a:endParaRPr lang="de-DE" sz="1800" dirty="0">
+              <a:latin typeface="Source Code Pro" panose="020B0509030403020204" pitchFamily="49" charset="77"/>
+            </a:endParaRPr>
+          </a:p>
+          <a:p>
+            <a:pPr marL="457200" indent="-457200">
+              <a:buAutoNum type="arabicPlain" startAt="8"/>
+            </a:pPr>
+            <a:r>
+              <a:rPr lang="de-DE" sz="1800" dirty="0">
+                <a:latin typeface="Source Code Pro" panose="020B0509030403020204" pitchFamily="49" charset="77"/>
+              </a:rPr>
+              <a:t> Go back </a:t>
+            </a:r>
+            <a:r>
+              <a:rPr lang="de-DE" sz="1800" dirty="0" err="1">
+                <a:latin typeface="Source Code Pro" panose="020B0509030403020204" pitchFamily="49" charset="77"/>
+              </a:rPr>
+              <a:t>to</a:t>
+            </a:r>
+            <a:r>
+              <a:rPr lang="de-DE" sz="1800" dirty="0">
+                <a:latin typeface="Source Code Pro" panose="020B0509030403020204" pitchFamily="49" charset="77"/>
+              </a:rPr>
+              <a:t> </a:t>
+            </a:r>
+            <a:r>
+              <a:rPr lang="de-DE" sz="1800" dirty="0" err="1">
+                <a:latin typeface="Source Code Pro" panose="020B0509030403020204" pitchFamily="49" charset="77"/>
+              </a:rPr>
+              <a:t>line</a:t>
+            </a:r>
+            <a:r>
+              <a:rPr lang="de-DE" sz="1800" dirty="0">
+                <a:latin typeface="Source Code Pro" panose="020B0509030403020204" pitchFamily="49" charset="77"/>
+              </a:rPr>
+              <a:t> 3</a:t>
+            </a:r>
+          </a:p>
+          <a:p>
+            <a:pPr marL="0" indent="0">
+              <a:buNone/>
+            </a:pPr>
+            <a:r>
+              <a:rPr lang="de-DE" sz="1800" dirty="0">
+                <a:latin typeface="Source Code Pro" panose="020B0509030403020204" pitchFamily="49" charset="77"/>
+              </a:rPr>
+              <a:t>9 Else </a:t>
+            </a:r>
+            <a:r>
+              <a:rPr lang="de-DE" sz="1800" dirty="0" err="1">
+                <a:latin typeface="Source Code Pro" panose="020B0509030403020204" pitchFamily="49" charset="77"/>
+              </a:rPr>
+              <a:t>if</a:t>
+            </a:r>
+            <a:r>
+              <a:rPr lang="de-DE" sz="1800" dirty="0">
+                <a:latin typeface="Source Code Pro" panose="020B0509030403020204" pitchFamily="49" charset="77"/>
+              </a:rPr>
+              <a:t> </a:t>
+            </a:r>
+            <a:r>
+              <a:rPr lang="de-DE" sz="1800" dirty="0" err="1">
+                <a:latin typeface="Source Code Pro" panose="020B0509030403020204" pitchFamily="49" charset="77"/>
+              </a:rPr>
+              <a:t>person</a:t>
+            </a:r>
+            <a:r>
+              <a:rPr lang="de-DE" sz="1800" dirty="0">
+                <a:latin typeface="Source Code Pro" panose="020B0509030403020204" pitchFamily="49" charset="77"/>
+              </a:rPr>
+              <a:t> </a:t>
+            </a:r>
+            <a:r>
+              <a:rPr lang="de-DE" sz="1800" dirty="0" err="1">
+                <a:latin typeface="Source Code Pro" panose="020B0509030403020204" pitchFamily="49" charset="77"/>
+              </a:rPr>
+              <a:t>is</a:t>
+            </a:r>
+            <a:r>
+              <a:rPr lang="de-DE" sz="1800" dirty="0">
+                <a:latin typeface="Source Code Pro" panose="020B0509030403020204" pitchFamily="49" charset="77"/>
+              </a:rPr>
+              <a:t> </a:t>
+            </a:r>
+            <a:r>
+              <a:rPr lang="de-DE" sz="1800" dirty="0" err="1">
+                <a:latin typeface="Source Code Pro" panose="020B0509030403020204" pitchFamily="49" charset="77"/>
+              </a:rPr>
+              <a:t>later</a:t>
+            </a:r>
+            <a:r>
+              <a:rPr lang="de-DE" sz="1800" dirty="0">
+                <a:latin typeface="Source Code Pro" panose="020B0509030403020204" pitchFamily="49" charset="77"/>
+              </a:rPr>
+              <a:t> in </a:t>
+            </a:r>
+            <a:r>
+              <a:rPr lang="de-DE" sz="1800" dirty="0" err="1">
+                <a:latin typeface="Source Code Pro" panose="020B0509030403020204" pitchFamily="49" charset="77"/>
+              </a:rPr>
+              <a:t>book</a:t>
+            </a:r>
+            <a:endParaRPr lang="de-DE" sz="1800" dirty="0">
+              <a:latin typeface="Source Code Pro" panose="020B0509030403020204" pitchFamily="49" charset="77"/>
+            </a:endParaRPr>
+          </a:p>
+          <a:p>
+            <a:pPr marL="457200" indent="-457200">
+              <a:buAutoNum type="arabicPlain" startAt="10"/>
+            </a:pPr>
+            <a:r>
+              <a:rPr lang="de-DE" sz="1800" dirty="0">
+                <a:latin typeface="Source Code Pro" panose="020B0509030403020204" pitchFamily="49" charset="77"/>
+              </a:rPr>
+              <a:t>Open </a:t>
+            </a:r>
+            <a:r>
+              <a:rPr lang="de-DE" sz="1800" dirty="0" err="1">
+                <a:latin typeface="Source Code Pro" panose="020B0509030403020204" pitchFamily="49" charset="77"/>
+              </a:rPr>
+              <a:t>to</a:t>
+            </a:r>
+            <a:r>
+              <a:rPr lang="de-DE" sz="1800" dirty="0">
+                <a:latin typeface="Source Code Pro" panose="020B0509030403020204" pitchFamily="49" charset="77"/>
+              </a:rPr>
+              <a:t> </a:t>
+            </a:r>
+            <a:r>
+              <a:rPr lang="de-DE" sz="1800" dirty="0" err="1">
+                <a:latin typeface="Source Code Pro" panose="020B0509030403020204" pitchFamily="49" charset="77"/>
+              </a:rPr>
+              <a:t>middle</a:t>
+            </a:r>
+            <a:r>
+              <a:rPr lang="de-DE" sz="1800" dirty="0">
+                <a:latin typeface="Source Code Pro" panose="020B0509030403020204" pitchFamily="49" charset="77"/>
+              </a:rPr>
+              <a:t> </a:t>
+            </a:r>
+            <a:r>
+              <a:rPr lang="de-DE" sz="1800" dirty="0" err="1">
+                <a:latin typeface="Source Code Pro" panose="020B0509030403020204" pitchFamily="49" charset="77"/>
+              </a:rPr>
+              <a:t>of</a:t>
+            </a:r>
+            <a:r>
+              <a:rPr lang="de-DE" sz="1800" dirty="0">
+                <a:latin typeface="Source Code Pro" panose="020B0509030403020204" pitchFamily="49" charset="77"/>
+              </a:rPr>
+              <a:t> </a:t>
+            </a:r>
+            <a:r>
+              <a:rPr lang="de-DE" sz="1800" dirty="0" err="1">
+                <a:latin typeface="Source Code Pro" panose="020B0509030403020204" pitchFamily="49" charset="77"/>
+              </a:rPr>
+              <a:t>right</a:t>
+            </a:r>
+            <a:r>
+              <a:rPr lang="de-DE" sz="1800" dirty="0">
+                <a:latin typeface="Source Code Pro" panose="020B0509030403020204" pitchFamily="49" charset="77"/>
+              </a:rPr>
+              <a:t> half </a:t>
+            </a:r>
+            <a:r>
+              <a:rPr lang="de-DE" sz="1800" dirty="0" err="1">
+                <a:latin typeface="Source Code Pro" panose="020B0509030403020204" pitchFamily="49" charset="77"/>
+              </a:rPr>
+              <a:t>of</a:t>
+            </a:r>
+            <a:r>
+              <a:rPr lang="de-DE" sz="1800" dirty="0">
+                <a:latin typeface="Source Code Pro" panose="020B0509030403020204" pitchFamily="49" charset="77"/>
+              </a:rPr>
+              <a:t> </a:t>
+            </a:r>
+            <a:r>
+              <a:rPr lang="de-DE" sz="1800" dirty="0" err="1">
+                <a:latin typeface="Source Code Pro" panose="020B0509030403020204" pitchFamily="49" charset="77"/>
+              </a:rPr>
+              <a:t>book</a:t>
+            </a:r>
+            <a:endParaRPr lang="de-DE" sz="1800" dirty="0">
+              <a:latin typeface="Source Code Pro" panose="020B0509030403020204" pitchFamily="49" charset="77"/>
+            </a:endParaRPr>
+          </a:p>
+          <a:p>
+            <a:pPr marL="457200" indent="-457200">
+              <a:buAutoNum type="arabicPlain" startAt="10"/>
+            </a:pPr>
+            <a:r>
+              <a:rPr lang="de-DE" sz="1800" dirty="0">
+                <a:latin typeface="Source Code Pro" panose="020B0509030403020204" pitchFamily="49" charset="77"/>
+              </a:rPr>
+              <a:t>Go back </a:t>
+            </a:r>
+            <a:r>
+              <a:rPr lang="de-DE" sz="1800" dirty="0" err="1">
+                <a:latin typeface="Source Code Pro" panose="020B0509030403020204" pitchFamily="49" charset="77"/>
+              </a:rPr>
+              <a:t>to</a:t>
+            </a:r>
+            <a:r>
+              <a:rPr lang="de-DE" sz="1800" dirty="0">
+                <a:latin typeface="Source Code Pro" panose="020B0509030403020204" pitchFamily="49" charset="77"/>
+              </a:rPr>
+              <a:t> </a:t>
+            </a:r>
+            <a:r>
+              <a:rPr lang="de-DE" sz="1800" dirty="0" err="1">
+                <a:latin typeface="Source Code Pro" panose="020B0509030403020204" pitchFamily="49" charset="77"/>
+              </a:rPr>
+              <a:t>line</a:t>
+            </a:r>
+            <a:r>
+              <a:rPr lang="de-DE" sz="1800" dirty="0">
+                <a:latin typeface="Source Code Pro" panose="020B0509030403020204" pitchFamily="49" charset="77"/>
+              </a:rPr>
+              <a:t> 3</a:t>
+            </a:r>
+          </a:p>
+          <a:p>
+            <a:pPr marL="457200" indent="-457200">
+              <a:buAutoNum type="arabicPlain" startAt="10"/>
+            </a:pPr>
+            <a:r>
+              <a:rPr lang="de-DE" sz="1800" dirty="0">
+                <a:latin typeface="Source Code Pro" panose="020B0509030403020204" pitchFamily="49" charset="77"/>
+              </a:rPr>
+              <a:t>Else</a:t>
+            </a:r>
+          </a:p>
+          <a:p>
+            <a:pPr marL="457200" indent="-457200">
+              <a:buAutoNum type="arabicPlain" startAt="10"/>
+            </a:pPr>
+            <a:r>
+              <a:rPr lang="de-DE" sz="1800" dirty="0">
+                <a:latin typeface="Source Code Pro" panose="020B0509030403020204" pitchFamily="49" charset="77"/>
+              </a:rPr>
+              <a:t>  13 </a:t>
+            </a:r>
+            <a:r>
+              <a:rPr lang="de-DE" sz="1800" dirty="0" err="1">
+                <a:latin typeface="Source Code Pro" panose="020B0509030403020204" pitchFamily="49" charset="77"/>
+              </a:rPr>
+              <a:t>Quit</a:t>
+            </a:r>
+            <a:endParaRPr lang="de-DE" sz="1800" dirty="0">
+              <a:latin typeface="Source Code Pro" panose="020B0509030403020204" pitchFamily="49" charset="77"/>
+            </a:endParaRPr>
+          </a:p>
+        </p:txBody>
+      </p:sp>
+    </p:spTree>
+    <p:extLst>
+      <p:ext uri="{BB962C8B-B14F-4D97-AF65-F5344CB8AC3E}">
+        <p14:creationId xmlns:p14="http://schemas.microsoft.com/office/powerpoint/2010/main" val="2347916767"/>
+      </p:ext>
+    </p:extLst>
+  </p:cSld>
+  <p:clrMapOvr>
+    <a:masterClrMapping/>
+  </p:clrMapOvr>
+</p:sld>
+</file>
+
 <file path=ppt/tags/tag1.xml><?xml version="1.0" encoding="utf-8"?>
 <p:tagLst xmlns:a="http://schemas.openxmlformats.org/drawingml/2006/main" xmlns:r="http://schemas.openxmlformats.org/officeDocument/2006/relationships" xmlns:p="http://schemas.openxmlformats.org/presentationml/2006/main">
   <p:tag name="THINKCELLUNDODONOTDELETE" val="0"/>
@@ -6296,6 +7055,12 @@
 </file>
 
 <file path=ppt/tags/tag6.xml><?xml version="1.0" encoding="utf-8"?>
+<p:tagLst xmlns:a="http://schemas.openxmlformats.org/drawingml/2006/main" xmlns:r="http://schemas.openxmlformats.org/officeDocument/2006/relationships" xmlns:p="http://schemas.openxmlformats.org/presentationml/2006/main">
+  <p:tag name="THINKCELLSHAPEDONOTDELETE" val="thinkcellActiveDocDoNotDelete"/>
+</p:tagLst>
+</file>
+
+<file path=ppt/tags/tag7.xml><?xml version="1.0" encoding="utf-8"?>
 <p:tagLst xmlns:a="http://schemas.openxmlformats.org/drawingml/2006/main" xmlns:r="http://schemas.openxmlformats.org/officeDocument/2006/relationships" xmlns:p="http://schemas.openxmlformats.org/presentationml/2006/main">
   <p:tag name="THINKCELLSHAPEDONOTDELETE" val="thinkcellActiveDocDoNotDelete"/>
 </p:tagLst>

</xml_diff>